<commit_message>
Fix scanf and array size for issue #97
</commit_message>
<xml_diff>
--- a/lectures/CC-02-Python.pptx
+++ b/lectures/CC-02-Python.pptx
@@ -5086,7 +5086,7 @@
                 <a:latin typeface="Courier New" panose="02070309020205020404" pitchFamily="49" charset="0"/>
                 <a:cs typeface="Courier New" panose="02070309020205020404" pitchFamily="49" charset="0"/>
               </a:rPr>
-              <a:t>    char line[101];</a:t>
+              <a:t>    char line[1001];</a:t>
             </a:r>
             <a:endParaRPr lang="en-US" b="1" dirty="0">
               <a:latin typeface="Courier New" panose="02070309020205020404" pitchFamily="49" charset="0"/>
@@ -5136,7 +5136,7 @@
                 <a:latin typeface="Courier New" panose="02070309020205020404" pitchFamily="49" charset="0"/>
                 <a:cs typeface="Courier New" panose="02070309020205020404" pitchFamily="49" charset="0"/>
               </a:rPr>
-              <a:t>("%100[^\n]s", line);</a:t>
+              <a:t>("%1000[^\n]s", line);</a:t>
             </a:r>
           </a:p>
           <a:p>

</xml_diff>